<commit_message>
Ported over to the main page
</commit_message>
<xml_diff>
--- a/static/img/Partners/Platinum/platinumLogos-100620a.pptx
+++ b/static/img/Partners/Platinum/platinumLogos-100620a.pptx
@@ -6,6 +6,7 @@
   </p:sldMasterIdLst>
   <p:sldIdLst>
     <p:sldId id="256" r:id="rId2"/>
+    <p:sldId id="257" r:id="rId3"/>
   </p:sldIdLst>
   <p:sldSz cx="9144000" cy="6858000" type="screen4x3"/>
   <p:notesSz cx="6858000" cy="9144000"/>
@@ -302,7 +303,7 @@
           <a:p>
             <a:fld id="{B91C49C3-96FB-4FF0-B652-A7A6D6BB86A9}" type="datetimeFigureOut">
               <a:rPr lang="en-US" smtClean="0"/>
-              <a:t>10/8/2020</a:t>
+              <a:t>10/16/2020</a:t>
             </a:fld>
             <a:endParaRPr lang="en-US"/>
           </a:p>
@@ -470,7 +471,7 @@
           <a:p>
             <a:fld id="{B91C49C3-96FB-4FF0-B652-A7A6D6BB86A9}" type="datetimeFigureOut">
               <a:rPr lang="en-US" smtClean="0"/>
-              <a:t>10/8/2020</a:t>
+              <a:t>10/16/2020</a:t>
             </a:fld>
             <a:endParaRPr lang="en-US"/>
           </a:p>
@@ -648,7 +649,7 @@
           <a:p>
             <a:fld id="{B91C49C3-96FB-4FF0-B652-A7A6D6BB86A9}" type="datetimeFigureOut">
               <a:rPr lang="en-US" smtClean="0"/>
-              <a:t>10/8/2020</a:t>
+              <a:t>10/16/2020</a:t>
             </a:fld>
             <a:endParaRPr lang="en-US"/>
           </a:p>
@@ -816,7 +817,7 @@
           <a:p>
             <a:fld id="{B91C49C3-96FB-4FF0-B652-A7A6D6BB86A9}" type="datetimeFigureOut">
               <a:rPr lang="en-US" smtClean="0"/>
-              <a:t>10/8/2020</a:t>
+              <a:t>10/16/2020</a:t>
             </a:fld>
             <a:endParaRPr lang="en-US"/>
           </a:p>
@@ -1061,7 +1062,7 @@
           <a:p>
             <a:fld id="{B91C49C3-96FB-4FF0-B652-A7A6D6BB86A9}" type="datetimeFigureOut">
               <a:rPr lang="en-US" smtClean="0"/>
-              <a:t>10/8/2020</a:t>
+              <a:t>10/16/2020</a:t>
             </a:fld>
             <a:endParaRPr lang="en-US"/>
           </a:p>
@@ -1346,7 +1347,7 @@
           <a:p>
             <a:fld id="{B91C49C3-96FB-4FF0-B652-A7A6D6BB86A9}" type="datetimeFigureOut">
               <a:rPr lang="en-US" smtClean="0"/>
-              <a:t>10/8/2020</a:t>
+              <a:t>10/16/2020</a:t>
             </a:fld>
             <a:endParaRPr lang="en-US"/>
           </a:p>
@@ -1765,7 +1766,7 @@
           <a:p>
             <a:fld id="{B91C49C3-96FB-4FF0-B652-A7A6D6BB86A9}" type="datetimeFigureOut">
               <a:rPr lang="en-US" smtClean="0"/>
-              <a:t>10/8/2020</a:t>
+              <a:t>10/16/2020</a:t>
             </a:fld>
             <a:endParaRPr lang="en-US"/>
           </a:p>
@@ -1882,7 +1883,7 @@
           <a:p>
             <a:fld id="{B91C49C3-96FB-4FF0-B652-A7A6D6BB86A9}" type="datetimeFigureOut">
               <a:rPr lang="en-US" smtClean="0"/>
-              <a:t>10/8/2020</a:t>
+              <a:t>10/16/2020</a:t>
             </a:fld>
             <a:endParaRPr lang="en-US"/>
           </a:p>
@@ -1977,7 +1978,7 @@
           <a:p>
             <a:fld id="{B91C49C3-96FB-4FF0-B652-A7A6D6BB86A9}" type="datetimeFigureOut">
               <a:rPr lang="en-US" smtClean="0"/>
-              <a:t>10/8/2020</a:t>
+              <a:t>10/16/2020</a:t>
             </a:fld>
             <a:endParaRPr lang="en-US"/>
           </a:p>
@@ -2252,7 +2253,7 @@
           <a:p>
             <a:fld id="{B91C49C3-96FB-4FF0-B652-A7A6D6BB86A9}" type="datetimeFigureOut">
               <a:rPr lang="en-US" smtClean="0"/>
-              <a:t>10/8/2020</a:t>
+              <a:t>10/16/2020</a:t>
             </a:fld>
             <a:endParaRPr lang="en-US"/>
           </a:p>
@@ -2504,7 +2505,7 @@
           <a:p>
             <a:fld id="{B91C49C3-96FB-4FF0-B652-A7A6D6BB86A9}" type="datetimeFigureOut">
               <a:rPr lang="en-US" smtClean="0"/>
-              <a:t>10/8/2020</a:t>
+              <a:t>10/16/2020</a:t>
             </a:fld>
             <a:endParaRPr lang="en-US"/>
           </a:p>
@@ -2715,7 +2716,7 @@
           <a:p>
             <a:fld id="{B91C49C3-96FB-4FF0-B652-A7A6D6BB86A9}" type="datetimeFigureOut">
               <a:rPr lang="en-US" smtClean="0"/>
-              <a:t>10/8/2020</a:t>
+              <a:t>10/16/2020</a:t>
             </a:fld>
             <a:endParaRPr lang="en-US"/>
           </a:p>
@@ -3194,7 +3195,7 @@
         </p:blipFill>
         <p:spPr bwMode="auto">
           <a:xfrm>
-            <a:off x="2771800" y="4293096"/>
+            <a:off x="3275856" y="2866338"/>
             <a:ext cx="4259758" cy="663800"/>
           </a:xfrm>
           <a:prstGeom prst="rect">
@@ -3239,7 +3240,7 @@
         </p:blipFill>
         <p:spPr bwMode="auto">
           <a:xfrm>
-            <a:off x="1841339" y="5336964"/>
+            <a:off x="827584" y="4653136"/>
             <a:ext cx="6120680" cy="1096758"/>
           </a:xfrm>
           <a:prstGeom prst="rect">
@@ -3261,6 +3262,122 @@
     <p:extLst>
       <p:ext uri="{BB962C8B-B14F-4D97-AF65-F5344CB8AC3E}">
         <p14:creationId xmlns:p14="http://schemas.microsoft.com/office/powerpoint/2010/main" val="1094249253"/>
+      </p:ext>
+    </p:extLst>
+  </p:cSld>
+  <p:clrMapOvr>
+    <a:masterClrMapping/>
+  </p:clrMapOvr>
+</p:sld>
+</file>
+
+<file path=ppt/slides/slide2.xml><?xml version="1.0" encoding="utf-8"?>
+<p:sld xmlns:a="http://schemas.openxmlformats.org/drawingml/2006/main" xmlns:r="http://schemas.openxmlformats.org/officeDocument/2006/relationships" xmlns:p="http://schemas.openxmlformats.org/presentationml/2006/main">
+  <p:cSld>
+    <p:spTree>
+      <p:nvGrpSpPr>
+        <p:cNvPr id="1" name=""/>
+        <p:cNvGrpSpPr/>
+        <p:nvPr/>
+      </p:nvGrpSpPr>
+      <p:grpSpPr>
+        <a:xfrm>
+          <a:off x="0" y="0"/>
+          <a:ext cx="0" cy="0"/>
+          <a:chOff x="0" y="0"/>
+          <a:chExt cx="0" cy="0"/>
+        </a:xfrm>
+      </p:grpSpPr>
+      <p:sp>
+        <p:nvSpPr>
+          <p:cNvPr id="5" name="Rectangle 4">
+            <a:extLst>
+              <a:ext uri="{FF2B5EF4-FFF2-40B4-BE49-F238E27FC236}">
+                <a16:creationId xmlns:a16="http://schemas.microsoft.com/office/drawing/2014/main" id="{EFE4E063-4698-4271-8234-8F3E1325B21E}"/>
+              </a:ext>
+            </a:extLst>
+          </p:cNvPr>
+          <p:cNvSpPr/>
+          <p:nvPr/>
+        </p:nvSpPr>
+        <p:spPr>
+          <a:xfrm>
+            <a:off x="3029471" y="2636912"/>
+            <a:ext cx="4752528" cy="1584176"/>
+          </a:xfrm>
+          <a:prstGeom prst="rect">
+            <a:avLst/>
+          </a:prstGeom>
+          <a:noFill/>
+          <a:ln>
+            <a:noFill/>
+          </a:ln>
+        </p:spPr>
+        <p:style>
+          <a:lnRef idx="2">
+            <a:schemeClr val="accent1">
+              <a:shade val="50000"/>
+            </a:schemeClr>
+          </a:lnRef>
+          <a:fillRef idx="1">
+            <a:schemeClr val="accent1"/>
+          </a:fillRef>
+          <a:effectRef idx="0">
+            <a:schemeClr val="accent1"/>
+          </a:effectRef>
+          <a:fontRef idx="minor">
+            <a:schemeClr val="lt1"/>
+          </a:fontRef>
+        </p:style>
+        <p:txBody>
+          <a:bodyPr rtlCol="0" anchor="ctr"/>
+          <a:lstStyle/>
+          <a:p>
+            <a:pPr algn="ctr"/>
+            <a:endParaRPr lang="en-US"/>
+          </a:p>
+        </p:txBody>
+      </p:sp>
+      <p:pic>
+        <p:nvPicPr>
+          <p:cNvPr id="7" name="Picture 6" descr="A picture containing drawing&#10;&#10;Description automatically generated">
+            <a:extLst>
+              <a:ext uri="{FF2B5EF4-FFF2-40B4-BE49-F238E27FC236}">
+                <a16:creationId xmlns:a16="http://schemas.microsoft.com/office/drawing/2014/main" id="{85E06964-7846-4965-9FA1-7619059029C2}"/>
+              </a:ext>
+            </a:extLst>
+          </p:cNvPr>
+          <p:cNvPicPr>
+            <a:picLocks noChangeAspect="1"/>
+          </p:cNvPicPr>
+          <p:nvPr/>
+        </p:nvPicPr>
+        <p:blipFill>
+          <a:blip r:embed="rId2" cstate="print">
+            <a:extLst>
+              <a:ext uri="{28A0092B-C50C-407E-A947-70E740481C1C}">
+                <a14:useLocalDpi xmlns:a14="http://schemas.microsoft.com/office/drawing/2010/main" val="0"/>
+              </a:ext>
+            </a:extLst>
+          </a:blip>
+          <a:stretch>
+            <a:fillRect/>
+          </a:stretch>
+        </p:blipFill>
+        <p:spPr>
+          <a:xfrm>
+            <a:off x="3397544" y="2924944"/>
+            <a:ext cx="4016382" cy="1008112"/>
+          </a:xfrm>
+          <a:prstGeom prst="rect">
+            <a:avLst/>
+          </a:prstGeom>
+        </p:spPr>
+      </p:pic>
+    </p:spTree>
+    <p:extLst>
+      <p:ext uri="{BB962C8B-B14F-4D97-AF65-F5344CB8AC3E}">
+        <p14:creationId xmlns:p14="http://schemas.microsoft.com/office/powerpoint/2010/main" val="2393533445"/>
       </p:ext>
     </p:extLst>
   </p:cSld>

</xml_diff>

<commit_message>
2020-10-24 Congratulation, Team IROS On-Demand
</commit_message>
<xml_diff>
--- a/static/img/Partners/Platinum/platinumLogos-100620a.pptx
+++ b/static/img/Partners/Platinum/platinumLogos-100620a.pptx
@@ -303,7 +303,7 @@
           <a:p>
             <a:fld id="{B91C49C3-96FB-4FF0-B652-A7A6D6BB86A9}" type="datetimeFigureOut">
               <a:rPr lang="en-US" smtClean="0"/>
-              <a:t>10/16/2020</a:t>
+              <a:t>10/21/2020</a:t>
             </a:fld>
             <a:endParaRPr lang="en-US"/>
           </a:p>
@@ -471,7 +471,7 @@
           <a:p>
             <a:fld id="{B91C49C3-96FB-4FF0-B652-A7A6D6BB86A9}" type="datetimeFigureOut">
               <a:rPr lang="en-US" smtClean="0"/>
-              <a:t>10/16/2020</a:t>
+              <a:t>10/21/2020</a:t>
             </a:fld>
             <a:endParaRPr lang="en-US"/>
           </a:p>
@@ -649,7 +649,7 @@
           <a:p>
             <a:fld id="{B91C49C3-96FB-4FF0-B652-A7A6D6BB86A9}" type="datetimeFigureOut">
               <a:rPr lang="en-US" smtClean="0"/>
-              <a:t>10/16/2020</a:t>
+              <a:t>10/21/2020</a:t>
             </a:fld>
             <a:endParaRPr lang="en-US"/>
           </a:p>
@@ -817,7 +817,7 @@
           <a:p>
             <a:fld id="{B91C49C3-96FB-4FF0-B652-A7A6D6BB86A9}" type="datetimeFigureOut">
               <a:rPr lang="en-US" smtClean="0"/>
-              <a:t>10/16/2020</a:t>
+              <a:t>10/21/2020</a:t>
             </a:fld>
             <a:endParaRPr lang="en-US"/>
           </a:p>
@@ -1062,7 +1062,7 @@
           <a:p>
             <a:fld id="{B91C49C3-96FB-4FF0-B652-A7A6D6BB86A9}" type="datetimeFigureOut">
               <a:rPr lang="en-US" smtClean="0"/>
-              <a:t>10/16/2020</a:t>
+              <a:t>10/21/2020</a:t>
             </a:fld>
             <a:endParaRPr lang="en-US"/>
           </a:p>
@@ -1347,7 +1347,7 @@
           <a:p>
             <a:fld id="{B91C49C3-96FB-4FF0-B652-A7A6D6BB86A9}" type="datetimeFigureOut">
               <a:rPr lang="en-US" smtClean="0"/>
-              <a:t>10/16/2020</a:t>
+              <a:t>10/21/2020</a:t>
             </a:fld>
             <a:endParaRPr lang="en-US"/>
           </a:p>
@@ -1766,7 +1766,7 @@
           <a:p>
             <a:fld id="{B91C49C3-96FB-4FF0-B652-A7A6D6BB86A9}" type="datetimeFigureOut">
               <a:rPr lang="en-US" smtClean="0"/>
-              <a:t>10/16/2020</a:t>
+              <a:t>10/21/2020</a:t>
             </a:fld>
             <a:endParaRPr lang="en-US"/>
           </a:p>
@@ -1883,7 +1883,7 @@
           <a:p>
             <a:fld id="{B91C49C3-96FB-4FF0-B652-A7A6D6BB86A9}" type="datetimeFigureOut">
               <a:rPr lang="en-US" smtClean="0"/>
-              <a:t>10/16/2020</a:t>
+              <a:t>10/21/2020</a:t>
             </a:fld>
             <a:endParaRPr lang="en-US"/>
           </a:p>
@@ -1978,7 +1978,7 @@
           <a:p>
             <a:fld id="{B91C49C3-96FB-4FF0-B652-A7A6D6BB86A9}" type="datetimeFigureOut">
               <a:rPr lang="en-US" smtClean="0"/>
-              <a:t>10/16/2020</a:t>
+              <a:t>10/21/2020</a:t>
             </a:fld>
             <a:endParaRPr lang="en-US"/>
           </a:p>
@@ -2253,7 +2253,7 @@
           <a:p>
             <a:fld id="{B91C49C3-96FB-4FF0-B652-A7A6D6BB86A9}" type="datetimeFigureOut">
               <a:rPr lang="en-US" smtClean="0"/>
-              <a:t>10/16/2020</a:t>
+              <a:t>10/21/2020</a:t>
             </a:fld>
             <a:endParaRPr lang="en-US"/>
           </a:p>
@@ -2505,7 +2505,7 @@
           <a:p>
             <a:fld id="{B91C49C3-96FB-4FF0-B652-A7A6D6BB86A9}" type="datetimeFigureOut">
               <a:rPr lang="en-US" smtClean="0"/>
-              <a:t>10/16/2020</a:t>
+              <a:t>10/21/2020</a:t>
             </a:fld>
             <a:endParaRPr lang="en-US"/>
           </a:p>
@@ -2716,7 +2716,7 @@
           <a:p>
             <a:fld id="{B91C49C3-96FB-4FF0-B652-A7A6D6BB86A9}" type="datetimeFigureOut">
               <a:rPr lang="en-US" smtClean="0"/>
-              <a:t>10/16/2020</a:t>
+              <a:t>10/21/2020</a:t>
             </a:fld>
             <a:endParaRPr lang="en-US"/>
           </a:p>
@@ -3302,7 +3302,7 @@
         </p:nvSpPr>
         <p:spPr>
           <a:xfrm>
-            <a:off x="3029471" y="2636912"/>
+            <a:off x="2195735" y="2636912"/>
             <a:ext cx="4752528" cy="1584176"/>
           </a:xfrm>
           <a:prstGeom prst="rect">
@@ -3340,10 +3340,10 @@
       </p:sp>
       <p:pic>
         <p:nvPicPr>
-          <p:cNvPr id="7" name="Picture 6" descr="A picture containing drawing&#10;&#10;Description automatically generated">
+          <p:cNvPr id="6" name="Picture 5" descr="Logo, company name&#10;&#10;Description automatically generated">
             <a:extLst>
               <a:ext uri="{FF2B5EF4-FFF2-40B4-BE49-F238E27FC236}">
-                <a16:creationId xmlns:a16="http://schemas.microsoft.com/office/drawing/2014/main" id="{85E06964-7846-4965-9FA1-7619059029C2}"/>
+                <a16:creationId xmlns:a16="http://schemas.microsoft.com/office/drawing/2014/main" id="{B30DE5EE-3949-43CF-A178-720FB203C657}"/>
               </a:ext>
             </a:extLst>
           </p:cNvPr>
@@ -3353,7 +3353,7 @@
           <p:nvPr/>
         </p:nvPicPr>
         <p:blipFill>
-          <a:blip r:embed="rId2" cstate="print">
+          <a:blip r:embed="rId2">
             <a:extLst>
               <a:ext uri="{28A0092B-C50C-407E-A947-70E740481C1C}">
                 <a14:useLocalDpi xmlns:a14="http://schemas.microsoft.com/office/drawing/2010/main" val="0"/>
@@ -3366,8 +3366,8 @@
         </p:blipFill>
         <p:spPr>
           <a:xfrm>
-            <a:off x="3397544" y="2924944"/>
-            <a:ext cx="4016382" cy="1008112"/>
+            <a:off x="2522429" y="2644278"/>
+            <a:ext cx="4099139" cy="1569444"/>
           </a:xfrm>
           <a:prstGeom prst="rect">
             <a:avLst/>

</xml_diff>